<commit_message>
Adicionando riscos e custos
</commit_message>
<xml_diff>
--- a/Sumário executivo.pptx
+++ b/Sumário executivo.pptx
@@ -5,13 +5,13 @@
     <p:sldMasterId id="2147483648" r:id="rId1"/>
   </p:sldMasterIdLst>
   <p:sldIdLst>
-    <p:sldId id="256" r:id="rId2"/>
-    <p:sldId id="257" r:id="rId3"/>
-    <p:sldId id="258" r:id="rId4"/>
-    <p:sldId id="259" r:id="rId5"/>
-    <p:sldId id="260" r:id="rId6"/>
-    <p:sldId id="261" r:id="rId7"/>
-    <p:sldId id="262" r:id="rId8"/>
+    <p:sldId id="256" r:id="rId3"/>
+    <p:sldId id="257" r:id="rId4"/>
+    <p:sldId id="258" r:id="rId5"/>
+    <p:sldId id="259" r:id="rId6"/>
+    <p:sldId id="260" r:id="rId7"/>
+    <p:sldId id="261" r:id="rId8"/>
+    <p:sldId id="262" r:id="rId9"/>
   </p:sldIdLst>
   <p:sldSz cx="12192000" cy="6858000"/>
   <p:notesSz cx="6858000" cy="9144000"/>
@@ -110,11 +110,6 @@
       </a:defRPr>
     </a:lvl9pPr>
   </p:defaultTextStyle>
-  <p:extLst>
-    <p:ext uri="{EFAFB233-063F-42B5-8137-9DF3F51BA10A}">
-      <p15:sldGuideLst xmlns:p15="http://schemas.microsoft.com/office/powerpoint/2012/main"/>
-    </p:ext>
-  </p:extLst>
 </p:presentation>
 </file>
 
@@ -174,7 +169,7 @@
             <a:spLocks noGrp="1"/>
           </p:cNvSpPr>
           <p:nvPr>
-            <p:ph type="subTitle" idx="1"/>
+            <p:ph type="subTitle" idx="1" hasCustomPrompt="1"/>
           </p:nvPr>
         </p:nvSpPr>
         <p:spPr>
@@ -249,7 +244,6 @@
           <a:p>
             <a:fld id="{7618A353-6B8C-44FD-9CE1-88DEE603CCA3}" type="datetimeFigureOut">
               <a:rPr lang="pt-BR" smtClean="0"/>
-              <a:t>06/09/2016</a:t>
             </a:fld>
             <a:endParaRPr lang="pt-BR"/>
           </a:p>
@@ -291,18 +285,12 @@
           <a:p>
             <a:fld id="{46709541-B09E-4CD0-A73E-EA894D63AB8A}" type="slidenum">
               <a:rPr lang="pt-BR" smtClean="0"/>
-              <a:t>‹nº›</a:t>
             </a:fld>
             <a:endParaRPr lang="pt-BR"/>
           </a:p>
         </p:txBody>
       </p:sp>
     </p:spTree>
-    <p:extLst>
-      <p:ext uri="{BB962C8B-B14F-4D97-AF65-F5344CB8AC3E}">
-        <p14:creationId xmlns:p14="http://schemas.microsoft.com/office/powerpoint/2010/main" val="2882820866"/>
-      </p:ext>
-    </p:extLst>
   </p:cSld>
   <p:clrMapOvr>
     <a:masterClrMapping/>
@@ -357,7 +345,7 @@
             <a:spLocks noGrp="1"/>
           </p:cNvSpPr>
           <p:nvPr>
-            <p:ph type="body" orient="vert" idx="1"/>
+            <p:ph type="body" orient="vert" idx="1" hasCustomPrompt="1"/>
           </p:nvPr>
         </p:nvSpPr>
         <p:spPr/>
@@ -370,6 +358,7 @@
               <a:rPr lang="pt-BR" smtClean="0"/>
               <a:t>Clique para editar o texto mestre</a:t>
             </a:r>
+            <a:endParaRPr lang="pt-BR" smtClean="0"/>
           </a:p>
           <a:p>
             <a:pPr lvl="1"/>
@@ -377,6 +366,7 @@
               <a:rPr lang="pt-BR" smtClean="0"/>
               <a:t>Segundo nível</a:t>
             </a:r>
+            <a:endParaRPr lang="pt-BR" smtClean="0"/>
           </a:p>
           <a:p>
             <a:pPr lvl="2"/>
@@ -384,6 +374,7 @@
               <a:rPr lang="pt-BR" smtClean="0"/>
               <a:t>Terceiro nível</a:t>
             </a:r>
+            <a:endParaRPr lang="pt-BR" smtClean="0"/>
           </a:p>
           <a:p>
             <a:pPr lvl="3"/>
@@ -391,6 +382,7 @@
               <a:rPr lang="pt-BR" smtClean="0"/>
               <a:t>Quarto nível</a:t>
             </a:r>
+            <a:endParaRPr lang="pt-BR" smtClean="0"/>
           </a:p>
           <a:p>
             <a:pPr lvl="4"/>
@@ -419,7 +411,6 @@
           <a:p>
             <a:fld id="{7618A353-6B8C-44FD-9CE1-88DEE603CCA3}" type="datetimeFigureOut">
               <a:rPr lang="pt-BR" smtClean="0"/>
-              <a:t>06/09/2016</a:t>
             </a:fld>
             <a:endParaRPr lang="pt-BR"/>
           </a:p>
@@ -461,18 +452,12 @@
           <a:p>
             <a:fld id="{46709541-B09E-4CD0-A73E-EA894D63AB8A}" type="slidenum">
               <a:rPr lang="pt-BR" smtClean="0"/>
-              <a:t>‹nº›</a:t>
             </a:fld>
             <a:endParaRPr lang="pt-BR"/>
           </a:p>
         </p:txBody>
       </p:sp>
     </p:spTree>
-    <p:extLst>
-      <p:ext uri="{BB962C8B-B14F-4D97-AF65-F5344CB8AC3E}">
-        <p14:creationId xmlns:p14="http://schemas.microsoft.com/office/powerpoint/2010/main" val="2182609104"/>
-      </p:ext>
-    </p:extLst>
   </p:cSld>
   <p:clrMapOvr>
     <a:masterClrMapping/>
@@ -532,7 +517,7 @@
             <a:spLocks noGrp="1"/>
           </p:cNvSpPr>
           <p:nvPr>
-            <p:ph type="body" orient="vert" idx="1"/>
+            <p:ph type="body" orient="vert" idx="1" hasCustomPrompt="1"/>
           </p:nvPr>
         </p:nvSpPr>
         <p:spPr>
@@ -550,6 +535,7 @@
               <a:rPr lang="pt-BR" smtClean="0"/>
               <a:t>Clique para editar o texto mestre</a:t>
             </a:r>
+            <a:endParaRPr lang="pt-BR" smtClean="0"/>
           </a:p>
           <a:p>
             <a:pPr lvl="1"/>
@@ -557,6 +543,7 @@
               <a:rPr lang="pt-BR" smtClean="0"/>
               <a:t>Segundo nível</a:t>
             </a:r>
+            <a:endParaRPr lang="pt-BR" smtClean="0"/>
           </a:p>
           <a:p>
             <a:pPr lvl="2"/>
@@ -564,6 +551,7 @@
               <a:rPr lang="pt-BR" smtClean="0"/>
               <a:t>Terceiro nível</a:t>
             </a:r>
+            <a:endParaRPr lang="pt-BR" smtClean="0"/>
           </a:p>
           <a:p>
             <a:pPr lvl="3"/>
@@ -571,6 +559,7 @@
               <a:rPr lang="pt-BR" smtClean="0"/>
               <a:t>Quarto nível</a:t>
             </a:r>
+            <a:endParaRPr lang="pt-BR" smtClean="0"/>
           </a:p>
           <a:p>
             <a:pPr lvl="4"/>
@@ -599,7 +588,6 @@
           <a:p>
             <a:fld id="{7618A353-6B8C-44FD-9CE1-88DEE603CCA3}" type="datetimeFigureOut">
               <a:rPr lang="pt-BR" smtClean="0"/>
-              <a:t>06/09/2016</a:t>
             </a:fld>
             <a:endParaRPr lang="pt-BR"/>
           </a:p>
@@ -641,18 +629,12 @@
           <a:p>
             <a:fld id="{46709541-B09E-4CD0-A73E-EA894D63AB8A}" type="slidenum">
               <a:rPr lang="pt-BR" smtClean="0"/>
-              <a:t>‹nº›</a:t>
             </a:fld>
             <a:endParaRPr lang="pt-BR"/>
           </a:p>
         </p:txBody>
       </p:sp>
     </p:spTree>
-    <p:extLst>
-      <p:ext uri="{BB962C8B-B14F-4D97-AF65-F5344CB8AC3E}">
-        <p14:creationId xmlns:p14="http://schemas.microsoft.com/office/powerpoint/2010/main" val="807534540"/>
-      </p:ext>
-    </p:extLst>
   </p:cSld>
   <p:clrMapOvr>
     <a:masterClrMapping/>
@@ -707,7 +689,7 @@
             <a:spLocks noGrp="1"/>
           </p:cNvSpPr>
           <p:nvPr>
-            <p:ph idx="1"/>
+            <p:ph idx="1" hasCustomPrompt="1"/>
           </p:nvPr>
         </p:nvSpPr>
         <p:spPr/>
@@ -720,6 +702,7 @@
               <a:rPr lang="pt-BR" smtClean="0"/>
               <a:t>Clique para editar o texto mestre</a:t>
             </a:r>
+            <a:endParaRPr lang="pt-BR" smtClean="0"/>
           </a:p>
           <a:p>
             <a:pPr lvl="1"/>
@@ -727,6 +710,7 @@
               <a:rPr lang="pt-BR" smtClean="0"/>
               <a:t>Segundo nível</a:t>
             </a:r>
+            <a:endParaRPr lang="pt-BR" smtClean="0"/>
           </a:p>
           <a:p>
             <a:pPr lvl="2"/>
@@ -734,6 +718,7 @@
               <a:rPr lang="pt-BR" smtClean="0"/>
               <a:t>Terceiro nível</a:t>
             </a:r>
+            <a:endParaRPr lang="pt-BR" smtClean="0"/>
           </a:p>
           <a:p>
             <a:pPr lvl="3"/>
@@ -741,6 +726,7 @@
               <a:rPr lang="pt-BR" smtClean="0"/>
               <a:t>Quarto nível</a:t>
             </a:r>
+            <a:endParaRPr lang="pt-BR" smtClean="0"/>
           </a:p>
           <a:p>
             <a:pPr lvl="4"/>
@@ -769,7 +755,6 @@
           <a:p>
             <a:fld id="{7618A353-6B8C-44FD-9CE1-88DEE603CCA3}" type="datetimeFigureOut">
               <a:rPr lang="pt-BR" smtClean="0"/>
-              <a:t>06/09/2016</a:t>
             </a:fld>
             <a:endParaRPr lang="pt-BR"/>
           </a:p>
@@ -811,18 +796,12 @@
           <a:p>
             <a:fld id="{46709541-B09E-4CD0-A73E-EA894D63AB8A}" type="slidenum">
               <a:rPr lang="pt-BR" smtClean="0"/>
-              <a:t>‹nº›</a:t>
             </a:fld>
             <a:endParaRPr lang="pt-BR"/>
           </a:p>
         </p:txBody>
       </p:sp>
     </p:spTree>
-    <p:extLst>
-      <p:ext uri="{BB962C8B-B14F-4D97-AF65-F5344CB8AC3E}">
-        <p14:creationId xmlns:p14="http://schemas.microsoft.com/office/powerpoint/2010/main" val="2127762486"/>
-      </p:ext>
-    </p:extLst>
   </p:cSld>
   <p:clrMapOvr>
     <a:masterClrMapping/>
@@ -886,7 +865,7 @@
             <a:spLocks noGrp="1"/>
           </p:cNvSpPr>
           <p:nvPr>
-            <p:ph type="body" idx="1"/>
+            <p:ph type="body" idx="1" hasCustomPrompt="1"/>
           </p:nvPr>
         </p:nvSpPr>
         <p:spPr>
@@ -1015,7 +994,6 @@
           <a:p>
             <a:fld id="{7618A353-6B8C-44FD-9CE1-88DEE603CCA3}" type="datetimeFigureOut">
               <a:rPr lang="pt-BR" smtClean="0"/>
-              <a:t>06/09/2016</a:t>
             </a:fld>
             <a:endParaRPr lang="pt-BR"/>
           </a:p>
@@ -1057,18 +1035,12 @@
           <a:p>
             <a:fld id="{46709541-B09E-4CD0-A73E-EA894D63AB8A}" type="slidenum">
               <a:rPr lang="pt-BR" smtClean="0"/>
-              <a:t>‹nº›</a:t>
             </a:fld>
             <a:endParaRPr lang="pt-BR"/>
           </a:p>
         </p:txBody>
       </p:sp>
     </p:spTree>
-    <p:extLst>
-      <p:ext uri="{BB962C8B-B14F-4D97-AF65-F5344CB8AC3E}">
-        <p14:creationId xmlns:p14="http://schemas.microsoft.com/office/powerpoint/2010/main" val="1634851236"/>
-      </p:ext>
-    </p:extLst>
   </p:cSld>
   <p:clrMapOvr>
     <a:masterClrMapping/>
@@ -1123,7 +1095,7 @@
             <a:spLocks noGrp="1"/>
           </p:cNvSpPr>
           <p:nvPr>
-            <p:ph sz="half" idx="1"/>
+            <p:ph sz="half" idx="1" hasCustomPrompt="1"/>
           </p:nvPr>
         </p:nvSpPr>
         <p:spPr>
@@ -1141,6 +1113,7 @@
               <a:rPr lang="pt-BR" smtClean="0"/>
               <a:t>Clique para editar o texto mestre</a:t>
             </a:r>
+            <a:endParaRPr lang="pt-BR" smtClean="0"/>
           </a:p>
           <a:p>
             <a:pPr lvl="1"/>
@@ -1148,6 +1121,7 @@
               <a:rPr lang="pt-BR" smtClean="0"/>
               <a:t>Segundo nível</a:t>
             </a:r>
+            <a:endParaRPr lang="pt-BR" smtClean="0"/>
           </a:p>
           <a:p>
             <a:pPr lvl="2"/>
@@ -1155,6 +1129,7 @@
               <a:rPr lang="pt-BR" smtClean="0"/>
               <a:t>Terceiro nível</a:t>
             </a:r>
+            <a:endParaRPr lang="pt-BR" smtClean="0"/>
           </a:p>
           <a:p>
             <a:pPr lvl="3"/>
@@ -1162,6 +1137,7 @@
               <a:rPr lang="pt-BR" smtClean="0"/>
               <a:t>Quarto nível</a:t>
             </a:r>
+            <a:endParaRPr lang="pt-BR" smtClean="0"/>
           </a:p>
           <a:p>
             <a:pPr lvl="4"/>
@@ -1180,7 +1156,7 @@
             <a:spLocks noGrp="1"/>
           </p:cNvSpPr>
           <p:nvPr>
-            <p:ph sz="half" idx="2"/>
+            <p:ph sz="half" idx="2" hasCustomPrompt="1"/>
           </p:nvPr>
         </p:nvSpPr>
         <p:spPr>
@@ -1198,6 +1174,7 @@
               <a:rPr lang="pt-BR" smtClean="0"/>
               <a:t>Clique para editar o texto mestre</a:t>
             </a:r>
+            <a:endParaRPr lang="pt-BR" smtClean="0"/>
           </a:p>
           <a:p>
             <a:pPr lvl="1"/>
@@ -1205,6 +1182,7 @@
               <a:rPr lang="pt-BR" smtClean="0"/>
               <a:t>Segundo nível</a:t>
             </a:r>
+            <a:endParaRPr lang="pt-BR" smtClean="0"/>
           </a:p>
           <a:p>
             <a:pPr lvl="2"/>
@@ -1212,6 +1190,7 @@
               <a:rPr lang="pt-BR" smtClean="0"/>
               <a:t>Terceiro nível</a:t>
             </a:r>
+            <a:endParaRPr lang="pt-BR" smtClean="0"/>
           </a:p>
           <a:p>
             <a:pPr lvl="3"/>
@@ -1219,6 +1198,7 @@
               <a:rPr lang="pt-BR" smtClean="0"/>
               <a:t>Quarto nível</a:t>
             </a:r>
+            <a:endParaRPr lang="pt-BR" smtClean="0"/>
           </a:p>
           <a:p>
             <a:pPr lvl="4"/>
@@ -1247,7 +1227,6 @@
           <a:p>
             <a:fld id="{7618A353-6B8C-44FD-9CE1-88DEE603CCA3}" type="datetimeFigureOut">
               <a:rPr lang="pt-BR" smtClean="0"/>
-              <a:t>06/09/2016</a:t>
             </a:fld>
             <a:endParaRPr lang="pt-BR"/>
           </a:p>
@@ -1289,18 +1268,12 @@
           <a:p>
             <a:fld id="{46709541-B09E-4CD0-A73E-EA894D63AB8A}" type="slidenum">
               <a:rPr lang="pt-BR" smtClean="0"/>
-              <a:t>‹nº›</a:t>
             </a:fld>
             <a:endParaRPr lang="pt-BR"/>
           </a:p>
         </p:txBody>
       </p:sp>
     </p:spTree>
-    <p:extLst>
-      <p:ext uri="{BB962C8B-B14F-4D97-AF65-F5344CB8AC3E}">
-        <p14:creationId xmlns:p14="http://schemas.microsoft.com/office/powerpoint/2010/main" val="15466446"/>
-      </p:ext>
-    </p:extLst>
   </p:cSld>
   <p:clrMapOvr>
     <a:masterClrMapping/>
@@ -1360,7 +1333,7 @@
             <a:spLocks noGrp="1"/>
           </p:cNvSpPr>
           <p:nvPr>
-            <p:ph type="body" idx="1"/>
+            <p:ph type="body" idx="1" hasCustomPrompt="1"/>
           </p:nvPr>
         </p:nvSpPr>
         <p:spPr>
@@ -1425,7 +1398,7 @@
             <a:spLocks noGrp="1"/>
           </p:cNvSpPr>
           <p:nvPr>
-            <p:ph sz="half" idx="2"/>
+            <p:ph sz="half" idx="2" hasCustomPrompt="1"/>
           </p:nvPr>
         </p:nvSpPr>
         <p:spPr>
@@ -1443,6 +1416,7 @@
               <a:rPr lang="pt-BR" smtClean="0"/>
               <a:t>Clique para editar o texto mestre</a:t>
             </a:r>
+            <a:endParaRPr lang="pt-BR" smtClean="0"/>
           </a:p>
           <a:p>
             <a:pPr lvl="1"/>
@@ -1450,6 +1424,7 @@
               <a:rPr lang="pt-BR" smtClean="0"/>
               <a:t>Segundo nível</a:t>
             </a:r>
+            <a:endParaRPr lang="pt-BR" smtClean="0"/>
           </a:p>
           <a:p>
             <a:pPr lvl="2"/>
@@ -1457,6 +1432,7 @@
               <a:rPr lang="pt-BR" smtClean="0"/>
               <a:t>Terceiro nível</a:t>
             </a:r>
+            <a:endParaRPr lang="pt-BR" smtClean="0"/>
           </a:p>
           <a:p>
             <a:pPr lvl="3"/>
@@ -1464,6 +1440,7 @@
               <a:rPr lang="pt-BR" smtClean="0"/>
               <a:t>Quarto nível</a:t>
             </a:r>
+            <a:endParaRPr lang="pt-BR" smtClean="0"/>
           </a:p>
           <a:p>
             <a:pPr lvl="4"/>
@@ -1482,7 +1459,7 @@
             <a:spLocks noGrp="1"/>
           </p:cNvSpPr>
           <p:nvPr>
-            <p:ph type="body" sz="quarter" idx="3"/>
+            <p:ph type="body" sz="quarter" idx="3" hasCustomPrompt="1"/>
           </p:nvPr>
         </p:nvSpPr>
         <p:spPr>
@@ -1547,7 +1524,7 @@
             <a:spLocks noGrp="1"/>
           </p:cNvSpPr>
           <p:nvPr>
-            <p:ph sz="quarter" idx="4"/>
+            <p:ph sz="quarter" idx="4" hasCustomPrompt="1"/>
           </p:nvPr>
         </p:nvSpPr>
         <p:spPr>
@@ -1565,6 +1542,7 @@
               <a:rPr lang="pt-BR" smtClean="0"/>
               <a:t>Clique para editar o texto mestre</a:t>
             </a:r>
+            <a:endParaRPr lang="pt-BR" smtClean="0"/>
           </a:p>
           <a:p>
             <a:pPr lvl="1"/>
@@ -1572,6 +1550,7 @@
               <a:rPr lang="pt-BR" smtClean="0"/>
               <a:t>Segundo nível</a:t>
             </a:r>
+            <a:endParaRPr lang="pt-BR" smtClean="0"/>
           </a:p>
           <a:p>
             <a:pPr lvl="2"/>
@@ -1579,6 +1558,7 @@
               <a:rPr lang="pt-BR" smtClean="0"/>
               <a:t>Terceiro nível</a:t>
             </a:r>
+            <a:endParaRPr lang="pt-BR" smtClean="0"/>
           </a:p>
           <a:p>
             <a:pPr lvl="3"/>
@@ -1586,6 +1566,7 @@
               <a:rPr lang="pt-BR" smtClean="0"/>
               <a:t>Quarto nível</a:t>
             </a:r>
+            <a:endParaRPr lang="pt-BR" smtClean="0"/>
           </a:p>
           <a:p>
             <a:pPr lvl="4"/>
@@ -1614,7 +1595,6 @@
           <a:p>
             <a:fld id="{7618A353-6B8C-44FD-9CE1-88DEE603CCA3}" type="datetimeFigureOut">
               <a:rPr lang="pt-BR" smtClean="0"/>
-              <a:t>06/09/2016</a:t>
             </a:fld>
             <a:endParaRPr lang="pt-BR"/>
           </a:p>
@@ -1656,18 +1636,12 @@
           <a:p>
             <a:fld id="{46709541-B09E-4CD0-A73E-EA894D63AB8A}" type="slidenum">
               <a:rPr lang="pt-BR" smtClean="0"/>
-              <a:t>‹nº›</a:t>
             </a:fld>
             <a:endParaRPr lang="pt-BR"/>
           </a:p>
         </p:txBody>
       </p:sp>
     </p:spTree>
-    <p:extLst>
-      <p:ext uri="{BB962C8B-B14F-4D97-AF65-F5344CB8AC3E}">
-        <p14:creationId xmlns:p14="http://schemas.microsoft.com/office/powerpoint/2010/main" val="595773888"/>
-      </p:ext>
-    </p:extLst>
   </p:cSld>
   <p:clrMapOvr>
     <a:masterClrMapping/>
@@ -1732,7 +1706,6 @@
           <a:p>
             <a:fld id="{7618A353-6B8C-44FD-9CE1-88DEE603CCA3}" type="datetimeFigureOut">
               <a:rPr lang="pt-BR" smtClean="0"/>
-              <a:t>06/09/2016</a:t>
             </a:fld>
             <a:endParaRPr lang="pt-BR"/>
           </a:p>
@@ -1774,18 +1747,12 @@
           <a:p>
             <a:fld id="{46709541-B09E-4CD0-A73E-EA894D63AB8A}" type="slidenum">
               <a:rPr lang="pt-BR" smtClean="0"/>
-              <a:t>‹nº›</a:t>
             </a:fld>
             <a:endParaRPr lang="pt-BR"/>
           </a:p>
         </p:txBody>
       </p:sp>
     </p:spTree>
-    <p:extLst>
-      <p:ext uri="{BB962C8B-B14F-4D97-AF65-F5344CB8AC3E}">
-        <p14:creationId xmlns:p14="http://schemas.microsoft.com/office/powerpoint/2010/main" val="1293113147"/>
-      </p:ext>
-    </p:extLst>
   </p:cSld>
   <p:clrMapOvr>
     <a:masterClrMapping/>
@@ -1827,7 +1794,6 @@
           <a:p>
             <a:fld id="{7618A353-6B8C-44FD-9CE1-88DEE603CCA3}" type="datetimeFigureOut">
               <a:rPr lang="pt-BR" smtClean="0"/>
-              <a:t>06/09/2016</a:t>
             </a:fld>
             <a:endParaRPr lang="pt-BR"/>
           </a:p>
@@ -1869,18 +1835,12 @@
           <a:p>
             <a:fld id="{46709541-B09E-4CD0-A73E-EA894D63AB8A}" type="slidenum">
               <a:rPr lang="pt-BR" smtClean="0"/>
-              <a:t>‹nº›</a:t>
             </a:fld>
             <a:endParaRPr lang="pt-BR"/>
           </a:p>
         </p:txBody>
       </p:sp>
     </p:spTree>
-    <p:extLst>
-      <p:ext uri="{BB962C8B-B14F-4D97-AF65-F5344CB8AC3E}">
-        <p14:creationId xmlns:p14="http://schemas.microsoft.com/office/powerpoint/2010/main" val="1709644702"/>
-      </p:ext>
-    </p:extLst>
   </p:cSld>
   <p:clrMapOvr>
     <a:masterClrMapping/>
@@ -1944,7 +1904,7 @@
             <a:spLocks noGrp="1"/>
           </p:cNvSpPr>
           <p:nvPr>
-            <p:ph idx="1"/>
+            <p:ph idx="1" hasCustomPrompt="1"/>
           </p:nvPr>
         </p:nvSpPr>
         <p:spPr>
@@ -1990,6 +1950,7 @@
               <a:rPr lang="pt-BR" smtClean="0"/>
               <a:t>Clique para editar o texto mestre</a:t>
             </a:r>
+            <a:endParaRPr lang="pt-BR" smtClean="0"/>
           </a:p>
           <a:p>
             <a:pPr lvl="1"/>
@@ -1997,6 +1958,7 @@
               <a:rPr lang="pt-BR" smtClean="0"/>
               <a:t>Segundo nível</a:t>
             </a:r>
+            <a:endParaRPr lang="pt-BR" smtClean="0"/>
           </a:p>
           <a:p>
             <a:pPr lvl="2"/>
@@ -2004,6 +1966,7 @@
               <a:rPr lang="pt-BR" smtClean="0"/>
               <a:t>Terceiro nível</a:t>
             </a:r>
+            <a:endParaRPr lang="pt-BR" smtClean="0"/>
           </a:p>
           <a:p>
             <a:pPr lvl="3"/>
@@ -2011,6 +1974,7 @@
               <a:rPr lang="pt-BR" smtClean="0"/>
               <a:t>Quarto nível</a:t>
             </a:r>
+            <a:endParaRPr lang="pt-BR" smtClean="0"/>
           </a:p>
           <a:p>
             <a:pPr lvl="4"/>
@@ -2029,7 +1993,7 @@
             <a:spLocks noGrp="1"/>
           </p:cNvSpPr>
           <p:nvPr>
-            <p:ph type="body" sz="half" idx="2"/>
+            <p:ph type="body" sz="half" idx="2" hasCustomPrompt="1"/>
           </p:nvPr>
         </p:nvSpPr>
         <p:spPr>
@@ -2104,7 +2068,6 @@
           <a:p>
             <a:fld id="{7618A353-6B8C-44FD-9CE1-88DEE603CCA3}" type="datetimeFigureOut">
               <a:rPr lang="pt-BR" smtClean="0"/>
-              <a:t>06/09/2016</a:t>
             </a:fld>
             <a:endParaRPr lang="pt-BR"/>
           </a:p>
@@ -2146,18 +2109,12 @@
           <a:p>
             <a:fld id="{46709541-B09E-4CD0-A73E-EA894D63AB8A}" type="slidenum">
               <a:rPr lang="pt-BR" smtClean="0"/>
-              <a:t>‹nº›</a:t>
             </a:fld>
             <a:endParaRPr lang="pt-BR"/>
           </a:p>
         </p:txBody>
       </p:sp>
     </p:spTree>
-    <p:extLst>
-      <p:ext uri="{BB962C8B-B14F-4D97-AF65-F5344CB8AC3E}">
-        <p14:creationId xmlns:p14="http://schemas.microsoft.com/office/powerpoint/2010/main" val="1047614315"/>
-      </p:ext>
-    </p:extLst>
   </p:cSld>
   <p:clrMapOvr>
     <a:masterClrMapping/>
@@ -2282,7 +2239,7 @@
             <a:spLocks noGrp="1"/>
           </p:cNvSpPr>
           <p:nvPr>
-            <p:ph type="body" sz="half" idx="2"/>
+            <p:ph type="body" sz="half" idx="2" hasCustomPrompt="1"/>
           </p:nvPr>
         </p:nvSpPr>
         <p:spPr>
@@ -2357,7 +2314,6 @@
           <a:p>
             <a:fld id="{7618A353-6B8C-44FD-9CE1-88DEE603CCA3}" type="datetimeFigureOut">
               <a:rPr lang="pt-BR" smtClean="0"/>
-              <a:t>06/09/2016</a:t>
             </a:fld>
             <a:endParaRPr lang="pt-BR"/>
           </a:p>
@@ -2399,18 +2355,12 @@
           <a:p>
             <a:fld id="{46709541-B09E-4CD0-A73E-EA894D63AB8A}" type="slidenum">
               <a:rPr lang="pt-BR" smtClean="0"/>
-              <a:t>‹nº›</a:t>
             </a:fld>
             <a:endParaRPr lang="pt-BR"/>
           </a:p>
         </p:txBody>
       </p:sp>
     </p:spTree>
-    <p:extLst>
-      <p:ext uri="{BB962C8B-B14F-4D97-AF65-F5344CB8AC3E}">
-        <p14:creationId xmlns:p14="http://schemas.microsoft.com/office/powerpoint/2010/main" val="2643893056"/>
-      </p:ext>
-    </p:extLst>
   </p:cSld>
   <p:clrMapOvr>
     <a:masterClrMapping/>
@@ -2503,6 +2453,7 @@
               <a:rPr lang="pt-BR" smtClean="0"/>
               <a:t>Clique para editar o texto mestre</a:t>
             </a:r>
+            <a:endParaRPr lang="pt-BR" smtClean="0"/>
           </a:p>
           <a:p>
             <a:pPr lvl="1"/>
@@ -2510,6 +2461,7 @@
               <a:rPr lang="pt-BR" smtClean="0"/>
               <a:t>Segundo nível</a:t>
             </a:r>
+            <a:endParaRPr lang="pt-BR" smtClean="0"/>
           </a:p>
           <a:p>
             <a:pPr lvl="2"/>
@@ -2517,6 +2469,7 @@
               <a:rPr lang="pt-BR" smtClean="0"/>
               <a:t>Terceiro nível</a:t>
             </a:r>
+            <a:endParaRPr lang="pt-BR" smtClean="0"/>
           </a:p>
           <a:p>
             <a:pPr lvl="3"/>
@@ -2524,6 +2477,7 @@
               <a:rPr lang="pt-BR" smtClean="0"/>
               <a:t>Quarto nível</a:t>
             </a:r>
+            <a:endParaRPr lang="pt-BR" smtClean="0"/>
           </a:p>
           <a:p>
             <a:pPr lvl="4"/>
@@ -2570,7 +2524,6 @@
           <a:p>
             <a:fld id="{7618A353-6B8C-44FD-9CE1-88DEE603CCA3}" type="datetimeFigureOut">
               <a:rPr lang="pt-BR" smtClean="0"/>
-              <a:t>06/09/2016</a:t>
             </a:fld>
             <a:endParaRPr lang="pt-BR"/>
           </a:p>
@@ -2648,18 +2601,12 @@
           <a:p>
             <a:fld id="{46709541-B09E-4CD0-A73E-EA894D63AB8A}" type="slidenum">
               <a:rPr lang="pt-BR" smtClean="0"/>
-              <a:t>‹nº›</a:t>
             </a:fld>
             <a:endParaRPr lang="pt-BR"/>
           </a:p>
         </p:txBody>
       </p:sp>
     </p:spTree>
-    <p:extLst>
-      <p:ext uri="{BB962C8B-B14F-4D97-AF65-F5344CB8AC3E}">
-        <p14:creationId xmlns:p14="http://schemas.microsoft.com/office/powerpoint/2010/main" val="131209703"/>
-      </p:ext>
-    </p:extLst>
   </p:cSld>
   <p:clrMap bg1="lt1" tx1="dk1" bg2="lt2" tx2="dk2" accent1="accent1" accent2="accent2" accent3="accent3" accent4="accent4" accent5="accent5" accent6="accent6" hlink="hlink" folHlink="folHlink"/>
   <p:sldLayoutIdLst>
@@ -2703,7 +2650,7 @@
         <a:spcBef>
           <a:spcPts val="1000"/>
         </a:spcBef>
-        <a:buFont typeface="Arial" panose="020B0604020202020204" pitchFamily="34" charset="0"/>
+        <a:buFont typeface="Arial" pitchFamily="34" charset="0"/>
         <a:buChar char="•"/>
         <a:defRPr sz="2800" kern="1200">
           <a:solidFill>
@@ -2721,7 +2668,7 @@
         <a:spcBef>
           <a:spcPts val="500"/>
         </a:spcBef>
-        <a:buFont typeface="Arial" panose="020B0604020202020204" pitchFamily="34" charset="0"/>
+        <a:buFont typeface="Arial" pitchFamily="34" charset="0"/>
         <a:buChar char="•"/>
         <a:defRPr sz="2400" kern="1200">
           <a:solidFill>
@@ -2739,7 +2686,7 @@
         <a:spcBef>
           <a:spcPts val="500"/>
         </a:spcBef>
-        <a:buFont typeface="Arial" panose="020B0604020202020204" pitchFamily="34" charset="0"/>
+        <a:buFont typeface="Arial" pitchFamily="34" charset="0"/>
         <a:buChar char="•"/>
         <a:defRPr sz="2000" kern="1200">
           <a:solidFill>
@@ -2757,7 +2704,7 @@
         <a:spcBef>
           <a:spcPts val="500"/>
         </a:spcBef>
-        <a:buFont typeface="Arial" panose="020B0604020202020204" pitchFamily="34" charset="0"/>
+        <a:buFont typeface="Arial" pitchFamily="34" charset="0"/>
         <a:buChar char="•"/>
         <a:defRPr sz="1800" kern="1200">
           <a:solidFill>
@@ -2775,7 +2722,7 @@
         <a:spcBef>
           <a:spcPts val="500"/>
         </a:spcBef>
-        <a:buFont typeface="Arial" panose="020B0604020202020204" pitchFamily="34" charset="0"/>
+        <a:buFont typeface="Arial" pitchFamily="34" charset="0"/>
         <a:buChar char="•"/>
         <a:defRPr sz="1800" kern="1200">
           <a:solidFill>
@@ -2793,7 +2740,7 @@
         <a:spcBef>
           <a:spcPts val="500"/>
         </a:spcBef>
-        <a:buFont typeface="Arial" panose="020B0604020202020204" pitchFamily="34" charset="0"/>
+        <a:buFont typeface="Arial" pitchFamily="34" charset="0"/>
         <a:buChar char="•"/>
         <a:defRPr sz="1800" kern="1200">
           <a:solidFill>
@@ -2811,7 +2758,7 @@
         <a:spcBef>
           <a:spcPts val="500"/>
         </a:spcBef>
-        <a:buFont typeface="Arial" panose="020B0604020202020204" pitchFamily="34" charset="0"/>
+        <a:buFont typeface="Arial" pitchFamily="34" charset="0"/>
         <a:buChar char="•"/>
         <a:defRPr sz="1800" kern="1200">
           <a:solidFill>
@@ -2829,7 +2776,7 @@
         <a:spcBef>
           <a:spcPts val="500"/>
         </a:spcBef>
-        <a:buFont typeface="Arial" panose="020B0604020202020204" pitchFamily="34" charset="0"/>
+        <a:buFont typeface="Arial" pitchFamily="34" charset="0"/>
         <a:buChar char="•"/>
         <a:defRPr sz="1800" kern="1200">
           <a:solidFill>
@@ -2847,7 +2794,7 @@
         <a:spcBef>
           <a:spcPts val="500"/>
         </a:spcBef>
-        <a:buFont typeface="Arial" panose="020B0604020202020204" pitchFamily="34" charset="0"/>
+        <a:buFont typeface="Arial" pitchFamily="34" charset="0"/>
         <a:buChar char="•"/>
         <a:defRPr sz="1800" kern="1200">
           <a:solidFill>
@@ -3021,11 +2968,6 @@
         </p:txBody>
       </p:sp>
     </p:spTree>
-    <p:extLst>
-      <p:ext uri="{BB962C8B-B14F-4D97-AF65-F5344CB8AC3E}">
-        <p14:creationId xmlns:p14="http://schemas.microsoft.com/office/powerpoint/2010/main" val="1333904853"/>
-      </p:ext>
-    </p:extLst>
   </p:cSld>
   <p:clrMapOvr>
     <a:masterClrMapping/>
@@ -3093,6 +3035,7 @@
               <a:rPr lang="pt-BR" dirty="0" smtClean="0"/>
               <a:t>Bruno Carvalho – Arquiteto; Desenvolvedor; Testador;</a:t>
             </a:r>
+            <a:endParaRPr lang="pt-BR" dirty="0" smtClean="0"/>
           </a:p>
           <a:p>
             <a:pPr algn="just"/>
@@ -3108,6 +3051,7 @@
               <a:rPr lang="pt-BR" dirty="0" smtClean="0"/>
               <a:t> – Analista; Desenvolvedor; Testador;</a:t>
             </a:r>
+            <a:endParaRPr lang="pt-BR" dirty="0" smtClean="0"/>
           </a:p>
           <a:p>
             <a:pPr algn="just"/>
@@ -3120,11 +3064,6 @@
         </p:txBody>
       </p:sp>
     </p:spTree>
-    <p:extLst>
-      <p:ext uri="{BB962C8B-B14F-4D97-AF65-F5344CB8AC3E}">
-        <p14:creationId xmlns:p14="http://schemas.microsoft.com/office/powerpoint/2010/main" val="2796871807"/>
-      </p:ext>
-    </p:extLst>
   </p:cSld>
   <p:clrMapOvr>
     <a:masterClrMapping/>
@@ -3192,6 +3131,7 @@
               <a:rPr lang="pt-BR" dirty="0" smtClean="0"/>
               <a:t>Substituir o processo atual para gerência de espaço físico por um sistema mais dinâmico, intuitivo e com melhor performance.</a:t>
             </a:r>
+            <a:endParaRPr lang="pt-BR" dirty="0" smtClean="0"/>
           </a:p>
           <a:p>
             <a:pPr algn="just"/>
@@ -3199,6 +3139,7 @@
               <a:rPr lang="pt-BR" dirty="0" smtClean="0"/>
               <a:t>Desenvolver um sistema web para gerenciar a alocação de turmas dos cursos de computação em salas de aula do prédio da Faculdade de Informática (FACIN).</a:t>
             </a:r>
+            <a:endParaRPr lang="pt-BR" dirty="0" smtClean="0"/>
           </a:p>
           <a:p>
             <a:pPr algn="just"/>
@@ -3211,11 +3152,6 @@
         </p:txBody>
       </p:sp>
     </p:spTree>
-    <p:extLst>
-      <p:ext uri="{BB962C8B-B14F-4D97-AF65-F5344CB8AC3E}">
-        <p14:creationId xmlns:p14="http://schemas.microsoft.com/office/powerpoint/2010/main" val="207457286"/>
-      </p:ext>
-    </p:extLst>
   </p:cSld>
   <p:clrMapOvr>
     <a:masterClrMapping/>
@@ -3288,11 +3224,6 @@
         </p:txBody>
       </p:sp>
     </p:spTree>
-    <p:extLst>
-      <p:ext uri="{BB962C8B-B14F-4D97-AF65-F5344CB8AC3E}">
-        <p14:creationId xmlns:p14="http://schemas.microsoft.com/office/powerpoint/2010/main" val="3403321941"/>
-      </p:ext>
-    </p:extLst>
   </p:cSld>
   <p:clrMapOvr>
     <a:masterClrMapping/>
@@ -3360,6 +3291,7 @@
               <a:rPr lang="pt-BR" dirty="0" smtClean="0"/>
               <a:t>O algoritmo de alocação de turmas não ter uma performance satisfatória;</a:t>
             </a:r>
+            <a:endParaRPr lang="pt-BR" dirty="0" smtClean="0"/>
           </a:p>
           <a:p>
             <a:pPr algn="just"/>
@@ -3367,6 +3299,7 @@
               <a:rPr lang="pt-BR" dirty="0" smtClean="0"/>
               <a:t>A solução não gerar a melhor alocação possível;</a:t>
             </a:r>
+            <a:endParaRPr lang="pt-BR" dirty="0" smtClean="0"/>
           </a:p>
           <a:p>
             <a:pPr algn="just"/>
@@ -3374,18 +3307,32 @@
               <a:rPr lang="pt-BR" dirty="0" smtClean="0"/>
               <a:t>Ter problemas com importação de dados devido à falta de padrão no formato das planilhas;</a:t>
             </a:r>
-          </a:p>
-          <a:p>
+            <a:endParaRPr lang="pt-BR" dirty="0" smtClean="0"/>
+          </a:p>
+          <a:p>
+            <a:r>
+              <a:rPr lang="pt-BR" dirty="0"/>
+              <a:t>Problema de compatibilidade com o ambiente do cliente;</a:t>
+            </a:r>
             <a:endParaRPr lang="pt-BR" dirty="0"/>
           </a:p>
+          <a:p>
+            <a:r>
+              <a:rPr lang="pt-BR" dirty="0"/>
+              <a:t>Algum dos componentes do grupo efetuar o cancelamento da disciplina;</a:t>
+            </a:r>
+            <a:endParaRPr lang="pt-BR" dirty="0"/>
+          </a:p>
+          <a:p>
+            <a:r>
+              <a:rPr lang="pt-BR" dirty="0"/>
+              <a:t>Pode haver eventuais imprevistos que possam atrasar o projeto;</a:t>
+            </a:r>
+            <a:endParaRPr lang="pt-BR" dirty="0"/>
+          </a:p>
         </p:txBody>
       </p:sp>
     </p:spTree>
-    <p:extLst>
-      <p:ext uri="{BB962C8B-B14F-4D97-AF65-F5344CB8AC3E}">
-        <p14:creationId xmlns:p14="http://schemas.microsoft.com/office/powerpoint/2010/main" val="24901047"/>
-      </p:ext>
-    </p:extLst>
   </p:cSld>
   <p:clrMapOvr>
     <a:masterClrMapping/>
@@ -3454,24 +3401,28 @@
               <a:rPr lang="pt-BR" dirty="0"/>
               <a:t>06/09 – Entrega da documentação referente ao projeto;</a:t>
             </a:r>
+            <a:endParaRPr lang="pt-BR" dirty="0"/>
           </a:p>
           <a:p>
             <a:r>
               <a:rPr lang="pt-BR" dirty="0"/>
               <a:t>20/09 – Entrega da análise sobre a utilização das ferramentas;</a:t>
             </a:r>
+            <a:endParaRPr lang="pt-BR" dirty="0"/>
           </a:p>
           <a:p>
             <a:r>
               <a:rPr lang="pt-BR" dirty="0"/>
               <a:t>04/10 – Criação da arquitetura do sistema;</a:t>
             </a:r>
+            <a:endParaRPr lang="pt-BR" dirty="0"/>
           </a:p>
           <a:p>
             <a:r>
               <a:rPr lang="pt-BR" dirty="0"/>
               <a:t>18/10 – Geração de demo;</a:t>
             </a:r>
+            <a:endParaRPr lang="pt-BR" dirty="0"/>
           </a:p>
           <a:p>
             <a:r>
@@ -3500,12 +3451,14 @@
               <a:rPr lang="pt-BR" dirty="0"/>
               <a:t>29/11 – Implementação do algoritmo de distribuição de salas;</a:t>
             </a:r>
+            <a:endParaRPr lang="pt-BR" dirty="0"/>
           </a:p>
           <a:p>
             <a:r>
               <a:rPr lang="pt-BR" dirty="0"/>
               <a:t>13/12 – Implementação da importação de dados;</a:t>
             </a:r>
+            <a:endParaRPr lang="pt-BR" dirty="0"/>
           </a:p>
           <a:p>
             <a:r>
@@ -3540,11 +3493,6 @@
         </p:txBody>
       </p:sp>
     </p:spTree>
-    <p:extLst>
-      <p:ext uri="{BB962C8B-B14F-4D97-AF65-F5344CB8AC3E}">
-        <p14:creationId xmlns:p14="http://schemas.microsoft.com/office/powerpoint/2010/main" val="3070117168"/>
-      </p:ext>
-    </p:extLst>
   </p:cSld>
   <p:clrMapOvr>
     <a:masterClrMapping/>
@@ -3602,187 +3550,373 @@
             <p:ph idx="1"/>
           </p:nvPr>
         </p:nvSpPr>
-        <p:spPr/>
+        <p:spPr>
+          <a:xfrm>
+            <a:off x="838835" y="1826260"/>
+            <a:ext cx="4991735" cy="4351655"/>
+          </a:xfrm>
+        </p:spPr>
         <p:txBody>
           <a:bodyPr>
-            <a:normAutofit fontScale="55000" lnSpcReduction="20000"/>
+            <a:normAutofit fontScale="90000" lnSpcReduction="10000"/>
           </a:bodyPr>
           <a:lstStyle/>
           <a:p>
             <a:r>
-              <a:rPr lang="pt-BR" dirty="0" smtClean="0"/>
+              <a:rPr lang="pt-BR" sz="1800" dirty="0" smtClean="0"/>
               <a:t>Horas disponíveis por membro da equipe: </a:t>
             </a:r>
             <a:r>
-              <a:rPr lang="pt-BR" dirty="0"/>
+              <a:rPr lang="pt-BR" sz="1800" dirty="0"/>
               <a:t>5</a:t>
             </a:r>
             <a:r>
-              <a:rPr lang="pt-BR" dirty="0" smtClean="0"/>
+              <a:rPr lang="pt-BR" sz="1800" dirty="0" smtClean="0"/>
               <a:t>h/semana</a:t>
             </a:r>
-            <a:endParaRPr lang="pt-BR" dirty="0" smtClean="0"/>
-          </a:p>
-          <a:p>
-            <a:r>
-              <a:rPr lang="pt-BR" dirty="0" smtClean="0"/>
-              <a:t>Total de horas da equipe por semana: </a:t>
-            </a:r>
-            <a:r>
-              <a:rPr lang="pt-BR" dirty="0" smtClean="0"/>
-              <a:t>15h/semana</a:t>
-            </a:r>
-            <a:endParaRPr lang="pt-BR" dirty="0" smtClean="0"/>
+            <a:endParaRPr lang="pt-BR" sz="1800" dirty="0" smtClean="0"/>
+          </a:p>
+          <a:p>
+            <a:r>
+              <a:rPr lang="pt-BR" sz="1800" dirty="0" smtClean="0"/>
+              <a:t>Total de horas da equipe por semana: 15h/semana</a:t>
+            </a:r>
+            <a:endParaRPr lang="pt-BR" sz="1800" dirty="0" smtClean="0"/>
           </a:p>
           <a:p>
             <a:pPr marL="0" indent="0">
               <a:buNone/>
             </a:pPr>
-            <a:endParaRPr lang="pt-BR" dirty="0"/>
-          </a:p>
-          <a:p>
-            <a:r>
-              <a:rPr lang="pt-BR" dirty="0" smtClean="0"/>
-              <a:t>Custo de 1 (um) ponto:  </a:t>
-            </a:r>
-            <a:r>
-              <a:rPr lang="pt-BR" dirty="0" smtClean="0"/>
-              <a:t>8h</a:t>
-            </a:r>
-            <a:endParaRPr lang="pt-BR" dirty="0" smtClean="0"/>
-          </a:p>
-          <a:p>
-            <a:r>
-              <a:rPr lang="pt-BR" dirty="0" smtClean="0"/>
+            <a:endParaRPr lang="pt-BR" sz="1800" dirty="0"/>
+          </a:p>
+          <a:p>
+            <a:r>
+              <a:rPr lang="pt-BR" sz="1800" dirty="0" smtClean="0"/>
+              <a:t>Custo de 1 (um) ponto:  8h</a:t>
+            </a:r>
+            <a:endParaRPr lang="pt-BR" sz="1800" dirty="0" smtClean="0"/>
+          </a:p>
+          <a:p>
+            <a:r>
+              <a:rPr lang="pt-BR" sz="1800" dirty="0" smtClean="0"/>
               <a:t>Total de pontos do projeto: 19</a:t>
             </a:r>
-          </a:p>
-          <a:p>
-            <a:r>
-              <a:rPr lang="pt-BR" dirty="0" smtClean="0"/>
-              <a:t>Tempo de projeto: </a:t>
-            </a:r>
-            <a:r>
-              <a:rPr lang="pt-BR" dirty="0" smtClean="0"/>
-              <a:t>152h (10 </a:t>
-            </a:r>
-            <a:r>
-              <a:rPr lang="pt-BR" dirty="0" smtClean="0"/>
-              <a:t>semanas)</a:t>
-            </a:r>
-            <a:endParaRPr lang="pt-BR" dirty="0"/>
-          </a:p>
-          <a:p>
-            <a:endParaRPr lang="pt-BR" dirty="0" smtClean="0"/>
-          </a:p>
-          <a:p>
-            <a:r>
-              <a:rPr lang="pt-BR" dirty="0"/>
+            <a:endParaRPr lang="pt-BR" sz="1800" dirty="0" smtClean="0"/>
+          </a:p>
+          <a:p>
+            <a:r>
+              <a:rPr lang="pt-BR" sz="1800" dirty="0" smtClean="0"/>
+              <a:t>Tempo de projeto: 152h (10 semanas)</a:t>
+            </a:r>
+            <a:endParaRPr lang="pt-BR" sz="1800" dirty="0"/>
+          </a:p>
+          <a:p>
+            <a:endParaRPr lang="pt-BR" sz="1800" dirty="0" smtClean="0"/>
+          </a:p>
+          <a:p>
+            <a:r>
+              <a:rPr lang="pt-BR" sz="1800" dirty="0"/>
               <a:t>Custo por hora do gerente: R</a:t>
             </a:r>
             <a:r>
-              <a:rPr lang="pt-BR" dirty="0" smtClean="0"/>
+              <a:rPr lang="pt-BR" sz="1800" dirty="0" smtClean="0"/>
               <a:t>$ 30,00</a:t>
             </a:r>
-            <a:endParaRPr lang="pt-BR" dirty="0"/>
-          </a:p>
-          <a:p>
-            <a:r>
-              <a:rPr lang="pt-BR" dirty="0" smtClean="0"/>
+            <a:endParaRPr lang="pt-BR" sz="1800" dirty="0"/>
+          </a:p>
+          <a:p>
+            <a:r>
+              <a:rPr lang="pt-BR" sz="1800" dirty="0" smtClean="0"/>
               <a:t>Custo </a:t>
             </a:r>
             <a:r>
-              <a:rPr lang="pt-BR" dirty="0"/>
+              <a:rPr lang="pt-BR" sz="1800" dirty="0"/>
               <a:t>por hora </a:t>
             </a:r>
             <a:r>
-              <a:rPr lang="pt-BR" dirty="0" smtClean="0"/>
+              <a:rPr lang="pt-BR" sz="1800" dirty="0" smtClean="0"/>
               <a:t>do testador: </a:t>
             </a:r>
             <a:r>
-              <a:rPr lang="pt-BR" dirty="0"/>
+              <a:rPr lang="pt-BR" sz="1800" dirty="0"/>
               <a:t>R</a:t>
             </a:r>
             <a:r>
-              <a:rPr lang="pt-BR" dirty="0" smtClean="0"/>
+              <a:rPr lang="pt-BR" sz="1800" dirty="0" smtClean="0"/>
               <a:t>$ 10,00 </a:t>
             </a:r>
-          </a:p>
-          <a:p>
-            <a:r>
-              <a:rPr lang="pt-BR" dirty="0"/>
+            <a:endParaRPr lang="pt-BR" sz="1800" dirty="0" smtClean="0"/>
+          </a:p>
+          <a:p>
+            <a:r>
+              <a:rPr lang="pt-BR" sz="1800" dirty="0"/>
               <a:t>Custo por hora do analista: R</a:t>
             </a:r>
             <a:r>
-              <a:rPr lang="pt-BR" dirty="0" smtClean="0"/>
+              <a:rPr lang="pt-BR" sz="1800" dirty="0" smtClean="0"/>
               <a:t>$ 15,00</a:t>
             </a:r>
-            <a:endParaRPr lang="pt-BR" dirty="0"/>
-          </a:p>
-          <a:p>
-            <a:r>
-              <a:rPr lang="pt-BR" dirty="0"/>
+            <a:endParaRPr lang="pt-BR" sz="1800" dirty="0"/>
+          </a:p>
+          <a:p>
+            <a:r>
+              <a:rPr lang="pt-BR" sz="1800" dirty="0"/>
               <a:t>Custo por hora do arquiteto: R</a:t>
             </a:r>
             <a:r>
-              <a:rPr lang="pt-BR" dirty="0" smtClean="0"/>
+              <a:rPr lang="pt-BR" sz="1800" dirty="0" smtClean="0"/>
               <a:t>$ 25,00</a:t>
             </a:r>
-          </a:p>
-          <a:p>
-            <a:r>
-              <a:rPr lang="pt-BR" dirty="0" smtClean="0"/>
+            <a:endParaRPr lang="pt-BR" sz="1800" dirty="0" smtClean="0"/>
+          </a:p>
+          <a:p>
+            <a:r>
+              <a:rPr lang="pt-BR" sz="1800" dirty="0" smtClean="0"/>
               <a:t>Custo </a:t>
             </a:r>
             <a:r>
-              <a:rPr lang="pt-BR" dirty="0"/>
+              <a:rPr lang="pt-BR" sz="1800" dirty="0"/>
               <a:t>por hora do desenvolvedor: R</a:t>
             </a:r>
             <a:r>
-              <a:rPr lang="pt-BR" dirty="0" smtClean="0"/>
-              <a:t>$ </a:t>
-            </a:r>
-            <a:r>
-              <a:rPr lang="pt-BR" dirty="0" smtClean="0"/>
-              <a:t>20,00</a:t>
-            </a:r>
-          </a:p>
-          <a:p>
-            <a:r>
-              <a:rPr lang="pt-BR" dirty="0" smtClean="0"/>
+              <a:rPr lang="pt-BR" sz="1800" dirty="0" smtClean="0"/>
+              <a:t>$ 20,00</a:t>
+            </a:r>
+            <a:endParaRPr lang="pt-BR" sz="1800" dirty="0" smtClean="0"/>
+          </a:p>
+          <a:p>
+            <a:r>
+              <a:rPr lang="pt-BR" sz="1800" dirty="0" smtClean="0"/>
               <a:t>Total por hora: R$100,00</a:t>
             </a:r>
-            <a:endParaRPr lang="pt-BR" dirty="0"/>
+            <a:endParaRPr lang="pt-BR" sz="1800" dirty="0"/>
+          </a:p>
+        </p:txBody>
+      </p:sp>
+      <p:sp>
+        <p:nvSpPr>
+          <p:cNvPr id="5" name="Espaço Reservado para Conteúdo 2"/>
+          <p:cNvSpPr>
+            <a:spLocks noGrp="1"/>
+          </p:cNvSpPr>
+          <p:nvPr/>
+        </p:nvSpPr>
+        <p:spPr>
+          <a:xfrm>
+            <a:off x="5743575" y="1826260"/>
+            <a:ext cx="4739005" cy="4351655"/>
+          </a:xfrm>
+          <a:prstGeom prst="rect">
+            <a:avLst/>
+          </a:prstGeom>
+        </p:spPr>
+        <p:txBody>
+          <a:bodyPr vert="horz" lIns="91440" tIns="45720" rIns="91440" bIns="45720" rtlCol="0">
+            <a:normAutofit/>
+          </a:bodyPr>
+          <a:lstStyle>
+            <a:lvl1pPr marL="228600" indent="-228600" algn="l" defTabSz="914400" rtl="0" eaLnBrk="1" latinLnBrk="0" hangingPunct="1">
+              <a:lnSpc>
+                <a:spcPct val="90000"/>
+              </a:lnSpc>
+              <a:spcBef>
+                <a:spcPts val="1000"/>
+              </a:spcBef>
+              <a:buFont typeface="Arial" pitchFamily="34" charset="0"/>
+              <a:buChar char="•"/>
+              <a:defRPr sz="2800" kern="1200">
+                <a:solidFill>
+                  <a:schemeClr val="tx1"/>
+                </a:solidFill>
+                <a:latin typeface="+mn-lt"/>
+                <a:ea typeface="+mn-ea"/>
+                <a:cs typeface="+mn-cs"/>
+              </a:defRPr>
+            </a:lvl1pPr>
+            <a:lvl2pPr marL="685800" indent="-228600" algn="l" defTabSz="914400" rtl="0" eaLnBrk="1" latinLnBrk="0" hangingPunct="1">
+              <a:lnSpc>
+                <a:spcPct val="90000"/>
+              </a:lnSpc>
+              <a:spcBef>
+                <a:spcPts val="500"/>
+              </a:spcBef>
+              <a:buFont typeface="Arial" pitchFamily="34" charset="0"/>
+              <a:buChar char="•"/>
+              <a:defRPr sz="2400" kern="1200">
+                <a:solidFill>
+                  <a:schemeClr val="tx1"/>
+                </a:solidFill>
+                <a:latin typeface="+mn-lt"/>
+                <a:ea typeface="+mn-ea"/>
+                <a:cs typeface="+mn-cs"/>
+              </a:defRPr>
+            </a:lvl2pPr>
+            <a:lvl3pPr marL="1143000" indent="-228600" algn="l" defTabSz="914400" rtl="0" eaLnBrk="1" latinLnBrk="0" hangingPunct="1">
+              <a:lnSpc>
+                <a:spcPct val="90000"/>
+              </a:lnSpc>
+              <a:spcBef>
+                <a:spcPts val="500"/>
+              </a:spcBef>
+              <a:buFont typeface="Arial" pitchFamily="34" charset="0"/>
+              <a:buChar char="•"/>
+              <a:defRPr sz="2000" kern="1200">
+                <a:solidFill>
+                  <a:schemeClr val="tx1"/>
+                </a:solidFill>
+                <a:latin typeface="+mn-lt"/>
+                <a:ea typeface="+mn-ea"/>
+                <a:cs typeface="+mn-cs"/>
+              </a:defRPr>
+            </a:lvl3pPr>
+            <a:lvl4pPr marL="1600200" indent="-228600" algn="l" defTabSz="914400" rtl="0" eaLnBrk="1" latinLnBrk="0" hangingPunct="1">
+              <a:lnSpc>
+                <a:spcPct val="90000"/>
+              </a:lnSpc>
+              <a:spcBef>
+                <a:spcPts val="500"/>
+              </a:spcBef>
+              <a:buFont typeface="Arial" pitchFamily="34" charset="0"/>
+              <a:buChar char="•"/>
+              <a:defRPr sz="1800" kern="1200">
+                <a:solidFill>
+                  <a:schemeClr val="tx1"/>
+                </a:solidFill>
+                <a:latin typeface="+mn-lt"/>
+                <a:ea typeface="+mn-ea"/>
+                <a:cs typeface="+mn-cs"/>
+              </a:defRPr>
+            </a:lvl4pPr>
+            <a:lvl5pPr marL="2057400" indent="-228600" algn="l" defTabSz="914400" rtl="0" eaLnBrk="1" latinLnBrk="0" hangingPunct="1">
+              <a:lnSpc>
+                <a:spcPct val="90000"/>
+              </a:lnSpc>
+              <a:spcBef>
+                <a:spcPts val="500"/>
+              </a:spcBef>
+              <a:buFont typeface="Arial" pitchFamily="34" charset="0"/>
+              <a:buChar char="•"/>
+              <a:defRPr sz="1800" kern="1200">
+                <a:solidFill>
+                  <a:schemeClr val="tx1"/>
+                </a:solidFill>
+                <a:latin typeface="+mn-lt"/>
+                <a:ea typeface="+mn-ea"/>
+                <a:cs typeface="+mn-cs"/>
+              </a:defRPr>
+            </a:lvl5pPr>
+            <a:lvl6pPr marL="2514600" indent="-228600" algn="l" defTabSz="914400" rtl="0" eaLnBrk="1" latinLnBrk="0" hangingPunct="1">
+              <a:lnSpc>
+                <a:spcPct val="90000"/>
+              </a:lnSpc>
+              <a:spcBef>
+                <a:spcPts val="500"/>
+              </a:spcBef>
+              <a:buFont typeface="Arial" pitchFamily="34" charset="0"/>
+              <a:buChar char="•"/>
+              <a:defRPr sz="1800" kern="1200">
+                <a:solidFill>
+                  <a:schemeClr val="tx1"/>
+                </a:solidFill>
+                <a:latin typeface="+mn-lt"/>
+                <a:ea typeface="+mn-ea"/>
+                <a:cs typeface="+mn-cs"/>
+              </a:defRPr>
+            </a:lvl6pPr>
+            <a:lvl7pPr marL="2971800" indent="-228600" algn="l" defTabSz="914400" rtl="0" eaLnBrk="1" latinLnBrk="0" hangingPunct="1">
+              <a:lnSpc>
+                <a:spcPct val="90000"/>
+              </a:lnSpc>
+              <a:spcBef>
+                <a:spcPts val="500"/>
+              </a:spcBef>
+              <a:buFont typeface="Arial" pitchFamily="34" charset="0"/>
+              <a:buChar char="•"/>
+              <a:defRPr sz="1800" kern="1200">
+                <a:solidFill>
+                  <a:schemeClr val="tx1"/>
+                </a:solidFill>
+                <a:latin typeface="+mn-lt"/>
+                <a:ea typeface="+mn-ea"/>
+                <a:cs typeface="+mn-cs"/>
+              </a:defRPr>
+            </a:lvl7pPr>
+            <a:lvl8pPr marL="3429000" indent="-228600" algn="l" defTabSz="914400" rtl="0" eaLnBrk="1" latinLnBrk="0" hangingPunct="1">
+              <a:lnSpc>
+                <a:spcPct val="90000"/>
+              </a:lnSpc>
+              <a:spcBef>
+                <a:spcPts val="500"/>
+              </a:spcBef>
+              <a:buFont typeface="Arial" pitchFamily="34" charset="0"/>
+              <a:buChar char="•"/>
+              <a:defRPr sz="1800" kern="1200">
+                <a:solidFill>
+                  <a:schemeClr val="tx1"/>
+                </a:solidFill>
+                <a:latin typeface="+mn-lt"/>
+                <a:ea typeface="+mn-ea"/>
+                <a:cs typeface="+mn-cs"/>
+              </a:defRPr>
+            </a:lvl8pPr>
+            <a:lvl9pPr marL="3886200" indent="-228600" algn="l" defTabSz="914400" rtl="0" eaLnBrk="1" latinLnBrk="0" hangingPunct="1">
+              <a:lnSpc>
+                <a:spcPct val="90000"/>
+              </a:lnSpc>
+              <a:spcBef>
+                <a:spcPts val="500"/>
+              </a:spcBef>
+              <a:buFont typeface="Arial" pitchFamily="34" charset="0"/>
+              <a:buChar char="•"/>
+              <a:defRPr sz="1800" kern="1200">
+                <a:solidFill>
+                  <a:schemeClr val="tx1"/>
+                </a:solidFill>
+                <a:latin typeface="+mn-lt"/>
+                <a:ea typeface="+mn-ea"/>
+                <a:cs typeface="+mn-cs"/>
+              </a:defRPr>
+            </a:lvl9pPr>
+          </a:lstStyle>
+          <a:p>
+            <a:r>
+              <a:rPr lang="pt-BR" sz="1600" dirty="0" smtClean="0"/>
+              <a:t>Custo estimado de recursos humanos: </a:t>
+            </a:r>
+            <a:r>
+              <a:rPr lang="pt-BR" sz="1600" smtClean="0">
+                <a:sym typeface="+mn-ea"/>
+              </a:rPr>
+              <a:t>R$15.200,00</a:t>
+            </a:r>
+            <a:endParaRPr lang="pt-BR" sz="1600" dirty="0" smtClean="0"/>
+          </a:p>
+          <a:p>
+            <a:r>
+              <a:rPr lang="pt-BR" sz="1600" dirty="0" smtClean="0"/>
+              <a:t>Custo estimado de hardware: R$1.500,00</a:t>
+            </a:r>
+            <a:endParaRPr lang="pt-BR" sz="1600" dirty="0" smtClean="0"/>
+          </a:p>
+          <a:p>
+            <a:endParaRPr lang="pt-BR" sz="1600" dirty="0" smtClean="0"/>
+          </a:p>
+          <a:p>
+            <a:r>
+              <a:rPr lang="pt-BR" sz="1600" dirty="0" smtClean="0"/>
+              <a:t>Custo estimado total: R$16.700,00</a:t>
+            </a:r>
+            <a:endParaRPr lang="pt-BR" sz="1600" dirty="0" smtClean="0"/>
           </a:p>
           <a:p>
             <a:pPr marL="0" indent="0">
               <a:buNone/>
             </a:pPr>
-            <a:endParaRPr lang="pt-BR" dirty="0"/>
-          </a:p>
-          <a:p>
-            <a:r>
-              <a:rPr lang="pt-BR" dirty="0" smtClean="0"/>
-              <a:t>Custo estimado total</a:t>
-            </a:r>
-            <a:r>
-              <a:rPr lang="pt-BR" smtClean="0"/>
-              <a:t>: </a:t>
-            </a:r>
-            <a:r>
-              <a:rPr lang="pt-BR" smtClean="0"/>
-              <a:t>R$15.200,00</a:t>
-            </a:r>
-            <a:endParaRPr lang="pt-BR" dirty="0"/>
+            <a:endParaRPr lang="pt-BR" sz="1800" dirty="0"/>
           </a:p>
         </p:txBody>
       </p:sp>
     </p:spTree>
-    <p:extLst>
-      <p:ext uri="{BB962C8B-B14F-4D97-AF65-F5344CB8AC3E}">
-        <p14:creationId xmlns:p14="http://schemas.microsoft.com/office/powerpoint/2010/main" val="2959085760"/>
-      </p:ext>
-    </p:extLst>
   </p:cSld>
   <p:clrMapOvr>
     <a:masterClrMapping/>
@@ -3833,7 +3967,7 @@
     </a:clrScheme>
     <a:fontScheme name="Escritório">
       <a:majorFont>
-        <a:latin typeface="Calibri Light" panose="020F0302020204030204"/>
+        <a:latin typeface="Calibri Light"/>
         <a:ea typeface=""/>
         <a:cs typeface=""/>
         <a:font script="Jpan" typeface="ＭＳ Ｐゴシック"/>
@@ -3868,7 +4002,7 @@
         <a:font script="Geor" typeface="Sylfaen"/>
       </a:majorFont>
       <a:minorFont>
-        <a:latin typeface="Calibri" panose="020F0502020204030204"/>
+        <a:latin typeface="Calibri"/>
         <a:ea typeface=""/>
         <a:cs typeface=""/>
         <a:font script="Jpan" typeface="ＭＳ Ｐゴシック"/>

</xml_diff>